<commit_message>
First draft of SAGA-MAGIC presentation
   Some pending changes from ECMSL presentation



git-svn-id: file://localhost/tmp/svn2git/svn@4994 defb5e50-622e-49ec-a68e-d72c7db87b45
</commit_message>
<xml_diff>
--- a/saga-talks/ecmls11-dare.pptx
+++ b/saga-talks/ecmls11-dare.pptx
@@ -6,7 +6,7 @@
     <p:sldMasterId id="2147483677" r:id="rId2"/>
   </p:sldMasterIdLst>
   <p:notesMasterIdLst>
-    <p:notesMasterId r:id="rId24"/>
+    <p:notesMasterId r:id="rId25"/>
   </p:notesMasterIdLst>
   <p:sldIdLst>
     <p:sldId id="256" r:id="rId3"/>
@@ -23,13 +23,14 @@
     <p:sldId id="791" r:id="rId14"/>
     <p:sldId id="773" r:id="rId15"/>
     <p:sldId id="830" r:id="rId16"/>
-    <p:sldId id="831" r:id="rId17"/>
-    <p:sldId id="817" r:id="rId18"/>
-    <p:sldId id="820" r:id="rId19"/>
-    <p:sldId id="815" r:id="rId20"/>
-    <p:sldId id="816" r:id="rId21"/>
-    <p:sldId id="757" r:id="rId22"/>
-    <p:sldId id="759" r:id="rId23"/>
+    <p:sldId id="838" r:id="rId17"/>
+    <p:sldId id="840" r:id="rId18"/>
+    <p:sldId id="817" r:id="rId19"/>
+    <p:sldId id="820" r:id="rId20"/>
+    <p:sldId id="815" r:id="rId21"/>
+    <p:sldId id="816" r:id="rId22"/>
+    <p:sldId id="757" r:id="rId23"/>
+    <p:sldId id="759" r:id="rId24"/>
   </p:sldIdLst>
   <p:sldSz cx="9144000" cy="6858000" type="screen4x3"/>
   <p:notesSz cx="6858000" cy="9144000"/>
@@ -214,7 +215,7 @@
             <a:fld id="{8E161E8F-4E15-A840-9658-105F9DD3DE22}" type="datetimeFigureOut">
               <a:rPr lang="en-US" smtClean="0"/>
               <a:pPr/>
-              <a:t>6/8/11</a:t>
+              <a:t>7/4/11</a:t>
             </a:fld>
             <a:endParaRPr lang="en-US"/>
           </a:p>
@@ -851,7 +852,7 @@
     </p:spTree>
     <p:extLst>
       <p:ext uri="{BB962C8B-B14F-4D97-AF65-F5344CB8AC3E}">
-        <p14:creationId xmlns="" xmlns:a="http://schemas.openxmlformats.org/drawingml/2006/main" xmlns:r="http://schemas.openxmlformats.org/officeDocument/2006/relationships" xmlns:p="http://schemas.openxmlformats.org/presentationml/2006/main" xmlns:p14="http://schemas.microsoft.com/office/powerpoint/2010/main" xmlns:mv="urn:schemas-microsoft-com:mac:vml" xmlns:mc="http://schemas.openxmlformats.org/markup-compatibility/2006" val="165362159"/>
+        <p14:creationId xmlns:mc="http://schemas.openxmlformats.org/markup-compatibility/2006" xmlns:mv="urn:schemas-microsoft-com:mac:vml" xmlns:p14="http://schemas.microsoft.com/office/powerpoint/2010/main" xmlns:p="http://schemas.openxmlformats.org/presentationml/2006/main" xmlns:r="http://schemas.openxmlformats.org/officeDocument/2006/relationships" xmlns:a="http://schemas.openxmlformats.org/drawingml/2006/main" xmlns="" val="165362159"/>
       </p:ext>
     </p:extLst>
   </p:cSld>
@@ -902,6 +903,99 @@
         </p:nvSpPr>
         <p:spPr/>
         <p:txBody>
+          <a:bodyPr/>
+          <a:lstStyle/>
+          <a:p>
+            <a:r>
+              <a:rPr lang="en-US" dirty="0" smtClean="0"/>
+              <a:t>(JK) Here,</a:t>
+            </a:r>
+            <a:r>
+              <a:rPr lang="en-US" baseline="0" dirty="0" smtClean="0"/>
+              <a:t> upper two tables represent the benefits of task level concurrency and scale-out strategy</a:t>
+            </a:r>
+            <a:endParaRPr lang="en-US" dirty="0"/>
+          </a:p>
+        </p:txBody>
+      </p:sp>
+      <p:sp>
+        <p:nvSpPr>
+          <p:cNvPr id="4" name="Slide Number Placeholder 3"/>
+          <p:cNvSpPr>
+            <a:spLocks noGrp="1"/>
+          </p:cNvSpPr>
+          <p:nvPr>
+            <p:ph type="sldNum" sz="quarter" idx="10"/>
+          </p:nvPr>
+        </p:nvSpPr>
+        <p:spPr/>
+        <p:txBody>
+          <a:bodyPr/>
+          <a:lstStyle/>
+          <a:p>
+            <a:fld id="{8FC6E2D0-3DA8-0A4F-9A90-3E1A8900A569}" type="slidenum">
+              <a:rPr lang="en-US" smtClean="0"/>
+              <a:pPr/>
+              <a:t>16</a:t>
+            </a:fld>
+            <a:endParaRPr lang="en-US" dirty="0"/>
+          </a:p>
+        </p:txBody>
+      </p:sp>
+    </p:spTree>
+    <p:extLst>
+      <p:ext uri="{BB962C8B-B14F-4D97-AF65-F5344CB8AC3E}">
+        <p14:creationId xmlns:mc="http://schemas.openxmlformats.org/markup-compatibility/2006" xmlns:mv="urn:schemas-microsoft-com:mac:vml" xmlns:p14="http://schemas.microsoft.com/office/powerpoint/2010/main" xmlns:p="http://schemas.openxmlformats.org/presentationml/2006/main" xmlns:r="http://schemas.openxmlformats.org/officeDocument/2006/relationships" xmlns:a="http://schemas.openxmlformats.org/drawingml/2006/main" xmlns="" val="165362159"/>
+      </p:ext>
+    </p:extLst>
+  </p:cSld>
+  <p:clrMapOvr>
+    <a:masterClrMapping/>
+  </p:clrMapOvr>
+</p:notes>
+</file>
+
+<file path=ppt/notesSlides/notesSlide6.xml><?xml version="1.0" encoding="utf-8"?>
+<p:notes xmlns:a="http://schemas.openxmlformats.org/drawingml/2006/main" xmlns:r="http://schemas.openxmlformats.org/officeDocument/2006/relationships" xmlns:mc="http://schemas.openxmlformats.org/markup-compatibility/2006" xmlns:mv="urn:schemas-microsoft-com:mac:vml" xmlns:p="http://schemas.openxmlformats.org/presentationml/2006/main" mc:Ignorable="mv" mc:PreserveAttributes="mv:*">
+  <p:cSld>
+    <p:spTree>
+      <p:nvGrpSpPr>
+        <p:cNvPr id="1" name=""/>
+        <p:cNvGrpSpPr/>
+        <p:nvPr/>
+      </p:nvGrpSpPr>
+      <p:grpSpPr>
+        <a:xfrm>
+          <a:off x="0" y="0"/>
+          <a:ext cx="0" cy="0"/>
+          <a:chOff x="0" y="0"/>
+          <a:chExt cx="0" cy="0"/>
+        </a:xfrm>
+      </p:grpSpPr>
+      <p:sp>
+        <p:nvSpPr>
+          <p:cNvPr id="2" name="Slide Image Placeholder 1"/>
+          <p:cNvSpPr>
+            <a:spLocks noGrp="1" noRot="1" noChangeAspect="1"/>
+          </p:cNvSpPr>
+          <p:nvPr>
+            <p:ph type="sldImg"/>
+          </p:nvPr>
+        </p:nvSpPr>
+        <p:spPr/>
+      </p:sp>
+      <p:sp>
+        <p:nvSpPr>
+          <p:cNvPr id="3" name="Notes Placeholder 2"/>
+          <p:cNvSpPr>
+            <a:spLocks noGrp="1"/>
+          </p:cNvSpPr>
+          <p:nvPr>
+            <p:ph type="body" idx="1"/>
+          </p:nvPr>
+        </p:nvSpPr>
+        <p:spPr/>
+        <p:txBody>
           <a:bodyPr>
             <a:normAutofit/>
           </a:bodyPr>
@@ -953,7 +1047,7 @@
             <a:fld id="{D344DA2A-F2F4-D74A-8AEC-1933B33E97E0}" type="slidenum">
               <a:rPr lang="en-US" smtClean="0"/>
               <a:pPr/>
-              <a:t>18</a:t>
+              <a:t>19</a:t>
             </a:fld>
             <a:endParaRPr lang="en-US"/>
           </a:p>
@@ -1193,7 +1287,7 @@
             <a:fld id="{4C4AD4EB-88D0-C141-9474-CCD86A78CB94}" type="datetimeFigureOut">
               <a:rPr lang="en-US" smtClean="0"/>
               <a:pPr/>
-              <a:t>6/8/11</a:t>
+              <a:t>7/4/11</a:t>
             </a:fld>
             <a:endParaRPr lang="en-US" dirty="0"/>
           </a:p>
@@ -1516,7 +1610,7 @@
             <a:fld id="{4C4AD4EB-88D0-C141-9474-CCD86A78CB94}" type="datetimeFigureOut">
               <a:rPr lang="en-US" smtClean="0"/>
               <a:pPr/>
-              <a:t>6/8/11</a:t>
+              <a:t>7/4/11</a:t>
             </a:fld>
             <a:endParaRPr lang="en-US"/>
           </a:p>
@@ -1792,7 +1886,7 @@
             <a:fld id="{4C4AD4EB-88D0-C141-9474-CCD86A78CB94}" type="datetimeFigureOut">
               <a:rPr lang="en-US" smtClean="0"/>
               <a:pPr/>
-              <a:t>6/8/11</a:t>
+              <a:t>7/4/11</a:t>
             </a:fld>
             <a:endParaRPr lang="en-US"/>
           </a:p>
@@ -2084,7 +2178,7 @@
             <a:fld id="{4C4AD4EB-88D0-C141-9474-CCD86A78CB94}" type="datetimeFigureOut">
               <a:rPr lang="en-US" smtClean="0"/>
               <a:pPr/>
-              <a:t>6/8/11</a:t>
+              <a:t>7/4/11</a:t>
             </a:fld>
             <a:endParaRPr lang="en-US"/>
           </a:p>
@@ -2411,7 +2505,7 @@
             <a:fld id="{4C4AD4EB-88D0-C141-9474-CCD86A78CB94}" type="datetimeFigureOut">
               <a:rPr lang="en-US" smtClean="0"/>
               <a:pPr/>
-              <a:t>6/8/11</a:t>
+              <a:t>7/4/11</a:t>
             </a:fld>
             <a:endParaRPr lang="en-US"/>
           </a:p>
@@ -2659,7 +2753,7 @@
             <a:fld id="{4C4AD4EB-88D0-C141-9474-CCD86A78CB94}" type="datetimeFigureOut">
               <a:rPr lang="en-US" smtClean="0"/>
               <a:pPr/>
-              <a:t>6/8/11</a:t>
+              <a:t>7/4/11</a:t>
             </a:fld>
             <a:endParaRPr lang="en-US"/>
           </a:p>
@@ -2836,7 +2930,7 @@
             <a:fld id="{4C4AD4EB-88D0-C141-9474-CCD86A78CB94}" type="datetimeFigureOut">
               <a:rPr lang="en-US" smtClean="0"/>
               <a:pPr/>
-              <a:t>6/8/11</a:t>
+              <a:t>7/4/11</a:t>
             </a:fld>
             <a:endParaRPr lang="en-US"/>
           </a:p>
@@ -3213,7 +3307,7 @@
             <a:fld id="{4C4AD4EB-88D0-C141-9474-CCD86A78CB94}" type="datetimeFigureOut">
               <a:rPr lang="en-US" smtClean="0"/>
               <a:pPr/>
-              <a:t>6/8/11</a:t>
+              <a:t>7/4/11</a:t>
             </a:fld>
             <a:endParaRPr lang="en-US"/>
           </a:p>
@@ -3484,7 +3578,7 @@
             <a:fld id="{4C4AD4EB-88D0-C141-9474-CCD86A78CB94}" type="datetimeFigureOut">
               <a:rPr lang="en-US" smtClean="0"/>
               <a:pPr/>
-              <a:t>6/8/11</a:t>
+              <a:t>7/4/11</a:t>
             </a:fld>
             <a:endParaRPr lang="en-US"/>
           </a:p>
@@ -3792,7 +3886,7 @@
             <a:fld id="{4C4AD4EB-88D0-C141-9474-CCD86A78CB94}" type="datetimeFigureOut">
               <a:rPr lang="en-US" smtClean="0"/>
               <a:pPr/>
-              <a:t>6/8/11</a:t>
+              <a:t>7/4/11</a:t>
             </a:fld>
             <a:endParaRPr lang="en-US"/>
           </a:p>
@@ -4086,7 +4180,7 @@
             <a:fld id="{4C4AD4EB-88D0-C141-9474-CCD86A78CB94}" type="datetimeFigureOut">
               <a:rPr lang="en-US" smtClean="0"/>
               <a:pPr/>
-              <a:t>6/8/11</a:t>
+              <a:t>7/4/11</a:t>
             </a:fld>
             <a:endParaRPr lang="en-US"/>
           </a:p>
@@ -4518,7 +4612,7 @@
             <a:fld id="{4C4AD4EB-88D0-C141-9474-CCD86A78CB94}" type="datetimeFigureOut">
               <a:rPr lang="en-US" smtClean="0"/>
               <a:pPr/>
-              <a:t>6/8/11</a:t>
+              <a:t>7/4/11</a:t>
             </a:fld>
             <a:endParaRPr lang="en-US"/>
           </a:p>
@@ -4866,7 +4960,7 @@
             <a:fld id="{4C4AD4EB-88D0-C141-9474-CCD86A78CB94}" type="datetimeFigureOut">
               <a:rPr lang="en-US" smtClean="0"/>
               <a:pPr/>
-              <a:t>6/8/11</a:t>
+              <a:t>7/4/11</a:t>
             </a:fld>
             <a:endParaRPr lang="en-US"/>
           </a:p>
@@ -4958,7 +5052,7 @@
             <a:fld id="{4C4AD4EB-88D0-C141-9474-CCD86A78CB94}" type="datetimeFigureOut">
               <a:rPr lang="en-US" smtClean="0"/>
               <a:pPr/>
-              <a:t>6/8/11</a:t>
+              <a:t>7/4/11</a:t>
             </a:fld>
             <a:endParaRPr lang="en-US"/>
           </a:p>
@@ -5297,7 +5391,7 @@
             <a:fld id="{4C4AD4EB-88D0-C141-9474-CCD86A78CB94}" type="datetimeFigureOut">
               <a:rPr lang="en-US" smtClean="0"/>
               <a:pPr/>
-              <a:t>6/8/11</a:t>
+              <a:t>7/4/11</a:t>
             </a:fld>
             <a:endParaRPr lang="en-US"/>
           </a:p>
@@ -5511,7 +5605,7 @@
             <a:fld id="{4C4AD4EB-88D0-C141-9474-CCD86A78CB94}" type="datetimeFigureOut">
               <a:rPr lang="en-US" smtClean="0"/>
               <a:pPr/>
-              <a:t>6/8/11</a:t>
+              <a:t>7/4/11</a:t>
             </a:fld>
             <a:endParaRPr lang="en-US"/>
           </a:p>
@@ -6193,7 +6287,7 @@
             <a:fld id="{9CA5C856-D373-2E49-9257-F90004C68B8A}" type="datetimeFigureOut">
               <a:rPr lang="en-US" smtClean="0"/>
               <a:pPr/>
-              <a:t>6/8/11</a:t>
+              <a:t>7/4/11</a:t>
             </a:fld>
             <a:endParaRPr lang="en-US" dirty="0"/>
           </a:p>
@@ -7186,7 +7280,7 @@
     </p:spTree>
     <p:extLst>
       <p:ext uri="{BB962C8B-B14F-4D97-AF65-F5344CB8AC3E}">
-        <p14:creationId xmlns="" xmlns:a="http://schemas.openxmlformats.org/drawingml/2006/main" xmlns:r="http://schemas.openxmlformats.org/officeDocument/2006/relationships" xmlns:p="http://schemas.openxmlformats.org/presentationml/2006/main" xmlns:p14="http://schemas.microsoft.com/office/powerpoint/2010/main" xmlns:mv="urn:schemas-microsoft-com:mac:vml" xmlns:mc="http://schemas.openxmlformats.org/markup-compatibility/2006" val="2144568309"/>
+        <p14:creationId xmlns:mc="http://schemas.openxmlformats.org/markup-compatibility/2006" xmlns:mv="urn:schemas-microsoft-com:mac:vml" xmlns:p14="http://schemas.microsoft.com/office/powerpoint/2010/main" xmlns:p="http://schemas.openxmlformats.org/presentationml/2006/main" xmlns:r="http://schemas.openxmlformats.org/officeDocument/2006/relationships" xmlns:a="http://schemas.openxmlformats.org/drawingml/2006/main" xmlns="" val="2144568309"/>
       </p:ext>
     </p:extLst>
   </p:cSld>
@@ -7347,7 +7441,7 @@
     </p:spTree>
     <p:extLst>
       <p:ext uri="{BB962C8B-B14F-4D97-AF65-F5344CB8AC3E}">
-        <p14:creationId xmlns="" xmlns:a="http://schemas.openxmlformats.org/drawingml/2006/main" xmlns:r="http://schemas.openxmlformats.org/officeDocument/2006/relationships" xmlns:p="http://schemas.openxmlformats.org/presentationml/2006/main" xmlns:p14="http://schemas.microsoft.com/office/powerpoint/2010/main" xmlns:mv="urn:schemas-microsoft-com:mac:vml" xmlns:mc="http://schemas.openxmlformats.org/markup-compatibility/2006" val="647122911"/>
+        <p14:creationId xmlns:mc="http://schemas.openxmlformats.org/markup-compatibility/2006" xmlns:mv="urn:schemas-microsoft-com:mac:vml" xmlns:p14="http://schemas.microsoft.com/office/powerpoint/2010/main" xmlns:p="http://schemas.openxmlformats.org/presentationml/2006/main" xmlns:r="http://schemas.openxmlformats.org/officeDocument/2006/relationships" xmlns:a="http://schemas.openxmlformats.org/drawingml/2006/main" xmlns="" val="647122911"/>
       </p:ext>
     </p:extLst>
   </p:cSld>
@@ -7394,15 +7488,15 @@
         <p:spPr/>
         <p:txBody>
           <a:bodyPr>
-            <a:normAutofit fontScale="90000"/>
+            <a:normAutofit/>
           </a:bodyPr>
           <a:lstStyle/>
           <a:p>
             <a:r>
-              <a:rPr lang="en-US" smtClean="0"/>
+              <a:rPr lang="en-US" sz="2400" dirty="0" smtClean="0"/>
               <a:t>DARE-NGS : Mapping on Scalable Distributed HPC resources</a:t>
             </a:r>
-            <a:endParaRPr lang="en-US" dirty="0"/>
+            <a:endParaRPr lang="en-US" sz="2400" dirty="0"/>
           </a:p>
         </p:txBody>
       </p:sp>
@@ -7443,7 +7537,7 @@
             <a:pPr lvl="1"/>
             <a:r>
               <a:rPr lang="en-US" dirty="0" smtClean="0"/>
-              <a:t>Be sure to not his IO bound</a:t>
+              <a:t>Be sure  this is not IO bound</a:t>
             </a:r>
           </a:p>
           <a:p>
@@ -7497,7 +7591,7 @@
     </p:spTree>
     <p:extLst>
       <p:ext uri="{BB962C8B-B14F-4D97-AF65-F5344CB8AC3E}">
-        <p14:creationId xmlns="" xmlns:a="http://schemas.openxmlformats.org/drawingml/2006/main" xmlns:r="http://schemas.openxmlformats.org/officeDocument/2006/relationships" xmlns:p="http://schemas.openxmlformats.org/presentationml/2006/main" xmlns:p14="http://schemas.microsoft.com/office/powerpoint/2010/main" xmlns:mv="urn:schemas-microsoft-com:mac:vml" xmlns:mc="http://schemas.openxmlformats.org/markup-compatibility/2006" val="3440781938"/>
+        <p14:creationId xmlns:mc="http://schemas.openxmlformats.org/markup-compatibility/2006" xmlns:mv="urn:schemas-microsoft-com:mac:vml" xmlns:p14="http://schemas.microsoft.com/office/powerpoint/2010/main" xmlns:p="http://schemas.openxmlformats.org/presentationml/2006/main" xmlns:r="http://schemas.openxmlformats.org/officeDocument/2006/relationships" xmlns:a="http://schemas.openxmlformats.org/drawingml/2006/main" xmlns="" val="3440781938"/>
       </p:ext>
     </p:extLst>
   </p:cSld>
@@ -7544,54 +7638,101 @@
         <p:spPr/>
         <p:txBody>
           <a:bodyPr>
-            <a:normAutofit fontScale="90000"/>
+            <a:normAutofit/>
           </a:bodyPr>
           <a:lstStyle/>
           <a:p>
             <a:r>
-              <a:rPr lang="en-US" sz="2800" dirty="0" smtClean="0"/>
+              <a:rPr lang="en-US" sz="2400" dirty="0" smtClean="0"/>
               <a:t>Tradeoffs: Comp. </a:t>
             </a:r>
             <a:r>
-              <a:rPr lang="en-US" sz="2800" dirty="0" err="1" smtClean="0"/>
+              <a:rPr lang="en-US" sz="2400" dirty="0" err="1" smtClean="0"/>
               <a:t>vs</a:t>
             </a:r>
             <a:r>
-              <a:rPr lang="en-US" sz="2800" dirty="0" smtClean="0"/>
+              <a:rPr lang="en-US" sz="2400" dirty="0" smtClean="0"/>
               <a:t> </a:t>
             </a:r>
             <a:r>
-              <a:rPr lang="en-US" sz="2800" dirty="0" err="1" smtClean="0"/>
+              <a:rPr lang="en-US" sz="2400" dirty="0" err="1" smtClean="0"/>
               <a:t>Mem</a:t>
             </a:r>
             <a:r>
-              <a:rPr lang="en-US" sz="2800" dirty="0" smtClean="0"/>
+              <a:rPr lang="en-US" sz="2400" dirty="0" smtClean="0"/>
               <a:t>. </a:t>
             </a:r>
             <a:r>
-              <a:rPr lang="en-US" sz="2800" dirty="0" err="1" smtClean="0"/>
+              <a:rPr lang="en-US" sz="2400" dirty="0" err="1" smtClean="0"/>
               <a:t>vs</a:t>
             </a:r>
             <a:r>
-              <a:rPr lang="en-US" sz="2800" dirty="0" smtClean="0"/>
+              <a:rPr lang="en-US" sz="2400" dirty="0" smtClean="0"/>
               <a:t> I/O </a:t>
             </a:r>
             <a:r>
-              <a:rPr lang="en-US" sz="2800" dirty="0" err="1" smtClean="0"/>
+              <a:rPr lang="en-US" sz="2400" dirty="0" err="1" smtClean="0"/>
               <a:t>vs</a:t>
             </a:r>
             <a:r>
-              <a:rPr lang="en-US" sz="2800" dirty="0" smtClean="0"/>
+              <a:rPr lang="en-US" sz="2400" dirty="0" smtClean="0"/>
               <a:t> </a:t>
             </a:r>
             <a:r>
-              <a:rPr lang="en-US" sz="2800" dirty="0" err="1" smtClean="0"/>
+              <a:rPr lang="en-US" sz="2400" dirty="0" err="1" smtClean="0"/>
               <a:t>DoD</a:t>
             </a:r>
-            <a:endParaRPr lang="en-US" sz="2800" dirty="0">
-              <a:latin typeface="Arial"/>
-              <a:cs typeface="Arial"/>
-            </a:endParaRPr>
+            <a:endParaRPr lang="en-US" sz="2400" dirty="0"/>
+          </a:p>
+        </p:txBody>
+      </p:sp>
+      <p:sp>
+        <p:nvSpPr>
+          <p:cNvPr id="7" name="Content Placeholder 6"/>
+          <p:cNvSpPr>
+            <a:spLocks noGrp="1"/>
+          </p:cNvSpPr>
+          <p:nvPr>
+            <p:ph idx="1"/>
+          </p:nvPr>
+        </p:nvSpPr>
+        <p:spPr>
+          <a:xfrm>
+            <a:off x="961146" y="4681636"/>
+            <a:ext cx="7966954" cy="1985864"/>
+          </a:xfrm>
+        </p:spPr>
+        <p:txBody>
+          <a:bodyPr>
+            <a:normAutofit/>
+          </a:bodyPr>
+          <a:lstStyle/>
+          <a:p>
+            <a:r>
+              <a:rPr lang="en-US" dirty="0" smtClean="0"/>
+              <a:t>R3 – average of R1 and R2 </a:t>
+            </a:r>
+          </a:p>
+          <a:p>
+            <a:pPr lvl="1"/>
+            <a:r>
+              <a:rPr lang="en-US" dirty="0" smtClean="0"/>
+              <a:t>Not including Transfer time</a:t>
+            </a:r>
+          </a:p>
+          <a:p>
+            <a:pPr lvl="1"/>
+            <a:r>
+              <a:rPr lang="en-US" dirty="0" smtClean="0"/>
+              <a:t>Coordination time quite small, including R/QB/FG</a:t>
+            </a:r>
+          </a:p>
+          <a:p>
+            <a:r>
+              <a:rPr lang="en-US" dirty="0" smtClean="0"/>
+              <a:t>Similar characteristics for different physical systems</a:t>
+            </a:r>
+            <a:endParaRPr lang="en-US" dirty="0"/>
           </a:p>
         </p:txBody>
       </p:sp>
@@ -7611,32 +7752,8 @@
         </p:blipFill>
         <p:spPr>
           <a:xfrm>
-            <a:off x="1082274" y="1172519"/>
+            <a:off x="650474" y="1013014"/>
             <a:ext cx="7809967" cy="3767781"/>
-          </a:xfrm>
-          <a:prstGeom prst="rect">
-            <a:avLst/>
-          </a:prstGeom>
-        </p:spPr>
-      </p:pic>
-      <p:pic>
-        <p:nvPicPr>
-          <p:cNvPr id="5" name="Picture 4" descr="file-tx.png"/>
-          <p:cNvPicPr>
-            <a:picLocks noChangeAspect="1"/>
-          </p:cNvPicPr>
-          <p:nvPr/>
-        </p:nvPicPr>
-        <p:blipFill>
-          <a:blip r:embed="rId4"/>
-          <a:stretch>
-            <a:fillRect/>
-          </a:stretch>
-        </p:blipFill>
-        <p:spPr>
-          <a:xfrm>
-            <a:off x="1333499" y="4787900"/>
-            <a:ext cx="5168901" cy="1980845"/>
           </a:xfrm>
           <a:prstGeom prst="rect">
             <a:avLst/>
@@ -7646,7 +7763,7 @@
     </p:spTree>
     <p:extLst>
       <p:ext uri="{BB962C8B-B14F-4D97-AF65-F5344CB8AC3E}">
-        <p14:creationId xmlns="" xmlns:a="http://schemas.openxmlformats.org/drawingml/2006/main" xmlns:r="http://schemas.openxmlformats.org/officeDocument/2006/relationships" xmlns:p="http://schemas.openxmlformats.org/presentationml/2006/main" xmlns:p14="http://schemas.microsoft.com/office/powerpoint/2010/main" xmlns:mv="urn:schemas-microsoft-com:mac:vml" xmlns:mc="http://schemas.openxmlformats.org/markup-compatibility/2006" val="3147052436"/>
+        <p14:creationId xmlns:mc="http://schemas.openxmlformats.org/markup-compatibility/2006" xmlns:mv="urn:schemas-microsoft-com:mac:vml" xmlns:p14="http://schemas.microsoft.com/office/powerpoint/2010/main" xmlns:p="http://schemas.openxmlformats.org/presentationml/2006/main" xmlns:r="http://schemas.openxmlformats.org/officeDocument/2006/relationships" xmlns:a="http://schemas.openxmlformats.org/drawingml/2006/main" xmlns="" val="3147052436"/>
       </p:ext>
     </p:extLst>
   </p:cSld>
@@ -7682,7 +7799,7 @@
       </p:grpSpPr>
       <p:sp>
         <p:nvSpPr>
-          <p:cNvPr id="7" name="Title 6"/>
+          <p:cNvPr id="2" name="Title 1"/>
           <p:cNvSpPr>
             <a:spLocks noGrp="1"/>
           </p:cNvSpPr>
@@ -7699,25 +7816,171 @@
           <a:p>
             <a:r>
               <a:rPr lang="en-US" sz="2400" dirty="0" smtClean="0"/>
-              <a:t>Towards Production DCI for NGS Analytics</a:t>
+              <a:t>Tradeoffs: Comp. </a:t>
+            </a:r>
+            <a:r>
+              <a:rPr lang="en-US" sz="2400" dirty="0" err="1" smtClean="0"/>
+              <a:t>vs</a:t>
+            </a:r>
+            <a:r>
+              <a:rPr lang="en-US" sz="2400" dirty="0" smtClean="0"/>
+              <a:t> </a:t>
+            </a:r>
+            <a:r>
+              <a:rPr lang="en-US" sz="2400" dirty="0" err="1" smtClean="0"/>
+              <a:t>Mem</a:t>
+            </a:r>
+            <a:r>
+              <a:rPr lang="en-US" sz="2400" dirty="0" smtClean="0"/>
+              <a:t>. </a:t>
+            </a:r>
+            <a:r>
+              <a:rPr lang="en-US" sz="2400" dirty="0" err="1" smtClean="0"/>
+              <a:t>vs</a:t>
+            </a:r>
+            <a:r>
+              <a:rPr lang="en-US" sz="2400" dirty="0" smtClean="0"/>
+              <a:t> I/O </a:t>
+            </a:r>
+            <a:r>
+              <a:rPr lang="en-US" sz="2400" dirty="0" err="1" smtClean="0"/>
+              <a:t>vs</a:t>
+            </a:r>
+            <a:r>
+              <a:rPr lang="en-US" sz="2400" dirty="0" smtClean="0"/>
+              <a:t> </a:t>
+            </a:r>
+            <a:r>
+              <a:rPr lang="en-US" sz="2400" dirty="0" err="1" smtClean="0"/>
+              <a:t>DoD</a:t>
             </a:r>
             <a:endParaRPr lang="en-US" sz="2400" dirty="0"/>
           </a:p>
         </p:txBody>
       </p:sp>
-      <p:sp>
-        <p:nvSpPr>
-          <p:cNvPr id="8" name="Content Placeholder 7"/>
-          <p:cNvSpPr>
-            <a:spLocks noGrp="1"/>
-          </p:cNvSpPr>
-          <p:nvPr>
-            <p:ph idx="1"/>
-          </p:nvPr>
-        </p:nvSpPr>
+      <p:pic>
+        <p:nvPicPr>
+          <p:cNvPr id="22" name="Picture 21" descr="bfast-dare-scaleout.png"/>
+          <p:cNvPicPr>
+            <a:picLocks noChangeAspect="1"/>
+          </p:cNvPicPr>
+          <p:nvPr/>
+        </p:nvPicPr>
+        <p:blipFill>
+          <a:blip r:embed="rId3"/>
+          <a:stretch>
+            <a:fillRect/>
+          </a:stretch>
+        </p:blipFill>
         <p:spPr>
           <a:xfrm>
-            <a:off x="529346" y="1529880"/>
+            <a:off x="1114424" y="1178114"/>
+            <a:ext cx="5297501" cy="2555686"/>
+          </a:xfrm>
+          <a:prstGeom prst="rect">
+            <a:avLst/>
+          </a:prstGeom>
+        </p:spPr>
+      </p:pic>
+      <p:pic>
+        <p:nvPicPr>
+          <p:cNvPr id="6" name="Picture 5" descr="file-tx.png"/>
+          <p:cNvPicPr>
+            <a:picLocks noChangeAspect="1"/>
+          </p:cNvPicPr>
+          <p:nvPr/>
+        </p:nvPicPr>
+        <p:blipFill>
+          <a:blip r:embed="rId4"/>
+          <a:stretch>
+            <a:fillRect/>
+          </a:stretch>
+        </p:blipFill>
+        <p:spPr>
+          <a:xfrm>
+            <a:off x="1155699" y="3733800"/>
+            <a:ext cx="6893103" cy="2641600"/>
+          </a:xfrm>
+          <a:prstGeom prst="rect">
+            <a:avLst/>
+          </a:prstGeom>
+        </p:spPr>
+      </p:pic>
+    </p:spTree>
+    <p:extLst>
+      <p:ext uri="{BB962C8B-B14F-4D97-AF65-F5344CB8AC3E}">
+        <p14:creationId xmlns:mc="http://schemas.openxmlformats.org/markup-compatibility/2006" xmlns:mv="urn:schemas-microsoft-com:mac:vml" xmlns:p14="http://schemas.microsoft.com/office/powerpoint/2010/main" xmlns:p="http://schemas.openxmlformats.org/presentationml/2006/main" xmlns:r="http://schemas.openxmlformats.org/officeDocument/2006/relationships" xmlns:a="http://schemas.openxmlformats.org/drawingml/2006/main" xmlns="" val="3147052436"/>
+      </p:ext>
+    </p:extLst>
+  </p:cSld>
+  <p:clrMapOvr>
+    <a:masterClrMapping/>
+  </p:clrMapOvr>
+  <p:timing>
+    <p:tnLst>
+      <p:par>
+        <p:cTn id="1" dur="indefinite" restart="never" nodeType="tmRoot"/>
+      </p:par>
+    </p:tnLst>
+  </p:timing>
+</p:sld>
+</file>
+
+<file path=ppt/slides/slide17.xml><?xml version="1.0" encoding="utf-8"?>
+<p:sld xmlns:a="http://schemas.openxmlformats.org/drawingml/2006/main" xmlns:r="http://schemas.openxmlformats.org/officeDocument/2006/relationships" xmlns:mc="http://schemas.openxmlformats.org/markup-compatibility/2006" xmlns:mv="urn:schemas-microsoft-com:mac:vml" xmlns:p="http://schemas.openxmlformats.org/presentationml/2006/main" mc:Ignorable="mv" mc:PreserveAttributes="mv:*">
+  <p:cSld>
+    <p:spTree>
+      <p:nvGrpSpPr>
+        <p:cNvPr id="1" name=""/>
+        <p:cNvGrpSpPr/>
+        <p:nvPr/>
+      </p:nvGrpSpPr>
+      <p:grpSpPr>
+        <a:xfrm>
+          <a:off x="0" y="0"/>
+          <a:ext cx="0" cy="0"/>
+          <a:chOff x="0" y="0"/>
+          <a:chExt cx="0" cy="0"/>
+        </a:xfrm>
+      </p:grpSpPr>
+      <p:sp>
+        <p:nvSpPr>
+          <p:cNvPr id="7" name="Title 6"/>
+          <p:cNvSpPr>
+            <a:spLocks noGrp="1"/>
+          </p:cNvSpPr>
+          <p:nvPr>
+            <p:ph type="title"/>
+          </p:nvPr>
+        </p:nvSpPr>
+        <p:spPr/>
+        <p:txBody>
+          <a:bodyPr>
+            <a:normAutofit/>
+          </a:bodyPr>
+          <a:lstStyle/>
+          <a:p>
+            <a:r>
+              <a:rPr lang="en-US" sz="2400" dirty="0" smtClean="0"/>
+              <a:t>Towards Production DCI for NGS Analytics</a:t>
+            </a:r>
+            <a:endParaRPr lang="en-US" sz="2400" dirty="0"/>
+          </a:p>
+        </p:txBody>
+      </p:sp>
+      <p:sp>
+        <p:nvSpPr>
+          <p:cNvPr id="8" name="Content Placeholder 7"/>
+          <p:cNvSpPr>
+            <a:spLocks noGrp="1"/>
+          </p:cNvSpPr>
+          <p:nvPr>
+            <p:ph idx="1"/>
+          </p:nvPr>
+        </p:nvSpPr>
+        <p:spPr>
+          <a:xfrm>
+            <a:off x="681746" y="1529880"/>
             <a:ext cx="8386053" cy="4608884"/>
           </a:xfrm>
         </p:spPr>
@@ -7737,22 +8000,22 @@
             </a:r>
             <a:r>
               <a:rPr lang="en-US" sz="1700" dirty="0" smtClean="0"/>
-              <a:t> not used for data-intensive applications” (</a:t>
+              <a:t> not used for data-intensive applications” (Fox)</a:t>
+            </a:r>
+          </a:p>
+          <a:p>
+            <a:pPr lvl="1"/>
+            <a:r>
+              <a:rPr lang="en-US" sz="1700" dirty="0" smtClean="0"/>
+              <a:t>Is it just about storage? Or is it about data transfer? High </a:t>
             </a:r>
             <a:r>
               <a:rPr lang="en-US" sz="1700" dirty="0" err="1" smtClean="0"/>
-              <a:t>Fpx</a:t>
+              <a:t>Amdahls</a:t>
             </a:r>
             <a:r>
               <a:rPr lang="en-US" sz="1700" dirty="0" smtClean="0"/>
-              <a:t>)</a:t>
-            </a:r>
-          </a:p>
-          <a:p>
-            <a:pPr lvl="1"/>
-            <a:r>
-              <a:rPr lang="en-US" sz="1700" dirty="0" smtClean="0"/>
-              <a:t>Is it just about storage? Or is it about data transfer?</a:t>
+              <a:t>?</a:t>
             </a:r>
           </a:p>
           <a:p>
@@ -7842,7 +8105,7 @@
 </p:sld>
 </file>
 
-<file path=ppt/slides/slide17.xml><?xml version="1.0" encoding="utf-8"?>
+<file path=ppt/slides/slide18.xml><?xml version="1.0" encoding="utf-8"?>
 <p:sld xmlns:a="http://schemas.openxmlformats.org/drawingml/2006/main" xmlns:r="http://schemas.openxmlformats.org/officeDocument/2006/relationships" xmlns:mc="http://schemas.openxmlformats.org/markup-compatibility/2006" xmlns:mv="urn:schemas-microsoft-com:mac:vml" xmlns:p="http://schemas.openxmlformats.org/presentationml/2006/main" mc:Ignorable="mv" mc:PreserveAttributes="mv:*">
   <p:cSld>
     <p:spTree>
@@ -7964,13 +8227,6 @@
             </a:r>
           </a:p>
           <a:p>
-            <a:pPr lvl="2"/>
-            <a:r>
-              <a:rPr lang="en-US" dirty="0" smtClean="0"/>
-              <a:t>What can we learn from HEP? WMS? </a:t>
-            </a:r>
-          </a:p>
-          <a:p>
             <a:pPr lvl="1"/>
             <a:r>
               <a:rPr lang="en-US" dirty="0" smtClean="0"/>
@@ -8043,30 +8299,6 @@
           </a:p>
         </p:txBody>
       </p:sp>
-      <p:pic>
-        <p:nvPicPr>
-          <p:cNvPr id="8" name="Picture 7" descr="windows_azure_small.jpg"/>
-          <p:cNvPicPr>
-            <a:picLocks noChangeAspect="1"/>
-          </p:cNvPicPr>
-          <p:nvPr/>
-        </p:nvPicPr>
-        <p:blipFill>
-          <a:blip r:embed="rId3"/>
-          <a:stretch>
-            <a:fillRect/>
-          </a:stretch>
-        </p:blipFill>
-        <p:spPr>
-          <a:xfrm>
-            <a:off x="6088538" y="3548661"/>
-            <a:ext cx="694531" cy="474753"/>
-          </a:xfrm>
-          <a:prstGeom prst="rect">
-            <a:avLst/>
-          </a:prstGeom>
-        </p:spPr>
-      </p:pic>
       <p:sp>
         <p:nvSpPr>
           <p:cNvPr id="13" name="Rectangle 12"/>
@@ -8115,7 +8347,7 @@
     </p:spTree>
     <p:extLst>
       <p:ext uri="{BB962C8B-B14F-4D97-AF65-F5344CB8AC3E}">
-        <p14:creationId xmlns="" xmlns:a="http://schemas.openxmlformats.org/drawingml/2006/main" xmlns:r="http://schemas.openxmlformats.org/officeDocument/2006/relationships" xmlns:p="http://schemas.openxmlformats.org/presentationml/2006/main" xmlns:p14="http://schemas.microsoft.com/office/powerpoint/2010/main" xmlns:mv="urn:schemas-microsoft-com:mac:vml" xmlns:mc="http://schemas.openxmlformats.org/markup-compatibility/2006" val="1575295952"/>
+        <p14:creationId xmlns:mc="http://schemas.openxmlformats.org/markup-compatibility/2006" xmlns:mv="urn:schemas-microsoft-com:mac:vml" xmlns:p14="http://schemas.microsoft.com/office/powerpoint/2010/main" xmlns:p="http://schemas.openxmlformats.org/presentationml/2006/main" xmlns:r="http://schemas.openxmlformats.org/officeDocument/2006/relationships" xmlns:a="http://schemas.openxmlformats.org/drawingml/2006/main" xmlns="" val="1575295952"/>
       </p:ext>
     </p:extLst>
   </p:cSld>
@@ -8132,7 +8364,7 @@
 </p:sld>
 </file>
 
-<file path=ppt/slides/slide18.xml><?xml version="1.0" encoding="utf-8"?>
+<file path=ppt/slides/slide19.xml><?xml version="1.0" encoding="utf-8"?>
 <p:sld xmlns:a="http://schemas.openxmlformats.org/drawingml/2006/main" xmlns:r="http://schemas.openxmlformats.org/officeDocument/2006/relationships" xmlns:mc="http://schemas.openxmlformats.org/markup-compatibility/2006" xmlns:mv="urn:schemas-microsoft-com:mac:vml" xmlns:p="http://schemas.openxmlformats.org/presentationml/2006/main" mc:Ignorable="mv" mc:PreserveAttributes="mv:*" show="0">
   <p:cSld>
     <p:spTree>
@@ -8282,185 +8514,6 @@
     <a:masterClrMapping/>
   </p:clrMapOvr>
   <p:transition/>
-  <p:timing>
-    <p:tnLst>
-      <p:par>
-        <p:cTn id="1" dur="indefinite" restart="never" nodeType="tmRoot"/>
-      </p:par>
-    </p:tnLst>
-  </p:timing>
-</p:sld>
-</file>
-
-<file path=ppt/slides/slide19.xml><?xml version="1.0" encoding="utf-8"?>
-<p:sld xmlns:a="http://schemas.openxmlformats.org/drawingml/2006/main" xmlns:r="http://schemas.openxmlformats.org/officeDocument/2006/relationships" xmlns:mc="http://schemas.openxmlformats.org/markup-compatibility/2006" xmlns:mv="urn:schemas-microsoft-com:mac:vml" xmlns:p="http://schemas.openxmlformats.org/presentationml/2006/main" mc:Ignorable="mv" mc:PreserveAttributes="mv:*">
-  <p:cSld>
-    <p:spTree>
-      <p:nvGrpSpPr>
-        <p:cNvPr id="1" name=""/>
-        <p:cNvGrpSpPr/>
-        <p:nvPr/>
-      </p:nvGrpSpPr>
-      <p:grpSpPr>
-        <a:xfrm>
-          <a:off x="0" y="0"/>
-          <a:ext cx="0" cy="0"/>
-          <a:chOff x="0" y="0"/>
-          <a:chExt cx="0" cy="0"/>
-        </a:xfrm>
-      </p:grpSpPr>
-      <p:sp>
-        <p:nvSpPr>
-          <p:cNvPr id="2" name="Title 1"/>
-          <p:cNvSpPr>
-            <a:spLocks noGrp="1"/>
-          </p:cNvSpPr>
-          <p:nvPr>
-            <p:ph type="title"/>
-          </p:nvPr>
-        </p:nvSpPr>
-        <p:spPr/>
-        <p:txBody>
-          <a:bodyPr>
-            <a:normAutofit/>
-          </a:bodyPr>
-          <a:lstStyle/>
-          <a:p>
-            <a:r>
-              <a:rPr lang="en-US" sz="2400" dirty="0" smtClean="0"/>
-              <a:t>What are the Challenges for LS Applications on Clouds?</a:t>
-            </a:r>
-            <a:endParaRPr lang="en-US" sz="2400" dirty="0"/>
-          </a:p>
-        </p:txBody>
-      </p:sp>
-      <p:sp>
-        <p:nvSpPr>
-          <p:cNvPr id="3" name="Content Placeholder 2"/>
-          <p:cNvSpPr>
-            <a:spLocks noGrp="1"/>
-          </p:cNvSpPr>
-          <p:nvPr>
-            <p:ph idx="1"/>
-          </p:nvPr>
-        </p:nvSpPr>
-        <p:spPr/>
-        <p:txBody>
-          <a:bodyPr>
-            <a:noAutofit/>
-          </a:bodyPr>
-          <a:lstStyle/>
-          <a:p>
-            <a:r>
-              <a:rPr lang="en-US" sz="1700" dirty="0" smtClean="0"/>
-              <a:t>Life-Science Applications have</a:t>
-            </a:r>
-          </a:p>
-          <a:p>
-            <a:pPr lvl="1"/>
-            <a:r>
-              <a:rPr lang="en-US" sz="1700" dirty="0" smtClean="0"/>
-              <a:t>Multi-parametric trade-offs exist: </a:t>
-            </a:r>
-            <a:r>
-              <a:rPr lang="en-US" sz="1700" dirty="0" err="1" smtClean="0"/>
-              <a:t>Mem</a:t>
-            </a:r>
-            <a:r>
-              <a:rPr lang="en-US" sz="1700" dirty="0" smtClean="0"/>
-              <a:t> </a:t>
-            </a:r>
-            <a:r>
-              <a:rPr lang="en-US" sz="1700" dirty="0" err="1" smtClean="0"/>
-              <a:t>vs</a:t>
-            </a:r>
-            <a:r>
-              <a:rPr lang="en-US" sz="1700" dirty="0" smtClean="0"/>
-              <a:t> I/O </a:t>
-            </a:r>
-            <a:r>
-              <a:rPr lang="en-US" sz="1700" dirty="0" err="1" smtClean="0"/>
-              <a:t>vs</a:t>
-            </a:r>
-            <a:r>
-              <a:rPr lang="en-US" sz="1700" dirty="0" smtClean="0"/>
-              <a:t> CPU </a:t>
-            </a:r>
-            <a:r>
-              <a:rPr lang="en-US" sz="1700" dirty="0" err="1" smtClean="0"/>
-              <a:t>vs</a:t>
-            </a:r>
-            <a:r>
-              <a:rPr lang="en-US" sz="1700" dirty="0" smtClean="0"/>
-              <a:t>  </a:t>
-            </a:r>
-            <a:r>
-              <a:rPr lang="en-US" sz="1700" dirty="0" err="1" smtClean="0"/>
-              <a:t>DoD</a:t>
-            </a:r>
-            <a:endParaRPr lang="en-US" sz="1700" dirty="0" smtClean="0"/>
-          </a:p>
-          <a:p>
-            <a:pPr lvl="1"/>
-            <a:r>
-              <a:rPr lang="en-US" sz="1700" dirty="0" smtClean="0"/>
-              <a:t>NGS: Sequence length variation</a:t>
-            </a:r>
-          </a:p>
-          <a:p>
-            <a:r>
-              <a:rPr lang="en-US" sz="1700" dirty="0" smtClean="0"/>
-              <a:t>Clouds as the natural CI for DI computing?</a:t>
-            </a:r>
-          </a:p>
-          <a:p>
-            <a:pPr lvl="1"/>
-            <a:r>
-              <a:rPr lang="en-US" sz="1700" dirty="0" smtClean="0"/>
-              <a:t>Need to support  distributed, dynamic loads</a:t>
-            </a:r>
-          </a:p>
-          <a:p>
-            <a:pPr lvl="1"/>
-            <a:r>
-              <a:rPr lang="en-US" sz="1700" dirty="0" smtClean="0"/>
-              <a:t>Is the Cloud data localization model scalable and/or sustainable?</a:t>
-            </a:r>
-          </a:p>
-          <a:p>
-            <a:pPr lvl="2"/>
-            <a:r>
-              <a:rPr lang="en-US" sz="1700" dirty="0" smtClean="0"/>
-              <a:t>Must address: How and when to move compute to data (or vice-versa) in scalable fashion?</a:t>
-            </a:r>
-          </a:p>
-          <a:p>
-            <a:pPr lvl="1"/>
-            <a:r>
-              <a:rPr lang="en-US" sz="1700" dirty="0" smtClean="0"/>
-              <a:t>DA challenges need to be addressed dynamically!</a:t>
-            </a:r>
-          </a:p>
-          <a:p>
-            <a:pPr lvl="2"/>
-            <a:r>
-              <a:rPr lang="en-US" sz="1700" dirty="0" smtClean="0"/>
-              <a:t>Resource Elasticity/Cloudburst + Heterogeneous task-resource binding and need to for application configuration trade-offs</a:t>
-            </a:r>
-          </a:p>
-          <a:p>
-            <a:pPr>
-              <a:buNone/>
-            </a:pPr>
-            <a:endParaRPr lang="en-US" sz="1700" dirty="0" smtClean="0"/>
-          </a:p>
-        </p:txBody>
-      </p:sp>
-    </p:spTree>
-  </p:cSld>
-  <p:clrMapOvr>
-    <a:masterClrMapping/>
-  </p:clrMapOvr>
   <p:timing>
     <p:tnLst>
       <p:par>
@@ -8542,7 +8595,7 @@
             <a:pPr lvl="1"/>
             <a:r>
               <a:rPr lang="en-US" sz="1700" dirty="0" smtClean="0"/>
-              <a:t>Implement NGS alignment analytics for “real” problems</a:t>
+              <a:t>Perform alignment for “real” NGS problems on production DCI</a:t>
             </a:r>
           </a:p>
           <a:p>
@@ -8707,90 +8760,132 @@
         </p:nvSpPr>
         <p:spPr/>
         <p:txBody>
-          <a:bodyPr/>
-          <a:lstStyle/>
-          <a:p>
-            <a:r>
-              <a:rPr lang="en-US" dirty="0" smtClean="0"/>
-              <a:t>Conclusions</a:t>
-            </a:r>
-            <a:endParaRPr lang="en-US" dirty="0"/>
-          </a:p>
-        </p:txBody>
-      </p:sp>
-      <p:sp>
-        <p:nvSpPr>
-          <p:cNvPr id="3" name="Content Placeholder 2"/>
-          <p:cNvSpPr>
-            <a:spLocks noGrp="1"/>
-          </p:cNvSpPr>
-          <p:nvPr>
-            <p:ph idx="1"/>
-          </p:nvPr>
-        </p:nvSpPr>
-        <p:spPr/>
-        <p:txBody>
           <a:bodyPr>
             <a:normAutofit/>
           </a:bodyPr>
           <a:lstStyle/>
           <a:p>
             <a:r>
-              <a:rPr lang="en-US" dirty="0" smtClean="0"/>
-              <a:t>LS Applications – compute and data intensive present broad range of challenges at scale</a:t>
+              <a:rPr lang="en-US" sz="2400" dirty="0" smtClean="0"/>
+              <a:t>What are the Challenges for LS Applications on Clouds?</a:t>
+            </a:r>
+            <a:endParaRPr lang="en-US" sz="2400" dirty="0"/>
+          </a:p>
+        </p:txBody>
+      </p:sp>
+      <p:sp>
+        <p:nvSpPr>
+          <p:cNvPr id="3" name="Content Placeholder 2"/>
+          <p:cNvSpPr>
+            <a:spLocks noGrp="1"/>
+          </p:cNvSpPr>
+          <p:nvPr>
+            <p:ph idx="1"/>
+          </p:nvPr>
+        </p:nvSpPr>
+        <p:spPr/>
+        <p:txBody>
+          <a:bodyPr>
+            <a:noAutofit/>
+          </a:bodyPr>
+          <a:lstStyle/>
+          <a:p>
+            <a:r>
+              <a:rPr lang="en-US" sz="1700" dirty="0" smtClean="0"/>
+              <a:t>Clouds as the natural CI for DI computing?</a:t>
             </a:r>
           </a:p>
           <a:p>
             <a:pPr lvl="1"/>
             <a:r>
-              <a:rPr lang="en-US" dirty="0" smtClean="0"/>
-              <a:t>Have characterized BFAST as an example of alignment that can be used in  production DCI  </a:t>
+              <a:rPr lang="en-US" sz="1700" dirty="0" smtClean="0"/>
+              <a:t>Need to support  distributed, dynamic loads</a:t>
+            </a:r>
+          </a:p>
+          <a:p>
+            <a:pPr lvl="2"/>
+            <a:r>
+              <a:rPr lang="en-US" sz="1700" dirty="0" smtClean="0"/>
+              <a:t>Multi-parametric trade-offs exist: </a:t>
+            </a:r>
+            <a:r>
+              <a:rPr lang="en-US" sz="1700" dirty="0" err="1" smtClean="0"/>
+              <a:t>Mem</a:t>
+            </a:r>
+            <a:r>
+              <a:rPr lang="en-US" sz="1700" dirty="0" smtClean="0"/>
+              <a:t> </a:t>
+            </a:r>
+            <a:r>
+              <a:rPr lang="en-US" sz="1700" dirty="0" err="1" smtClean="0"/>
+              <a:t>vs</a:t>
+            </a:r>
+            <a:r>
+              <a:rPr lang="en-US" sz="1700" dirty="0" smtClean="0"/>
+              <a:t> I/O </a:t>
+            </a:r>
+            <a:r>
+              <a:rPr lang="en-US" sz="1700" dirty="0" err="1" smtClean="0"/>
+              <a:t>vs</a:t>
+            </a:r>
+            <a:r>
+              <a:rPr lang="en-US" sz="1700" dirty="0" smtClean="0"/>
+              <a:t> CPU </a:t>
+            </a:r>
+            <a:r>
+              <a:rPr lang="en-US" sz="1700" dirty="0" err="1" smtClean="0"/>
+              <a:t>vs</a:t>
+            </a:r>
+            <a:r>
+              <a:rPr lang="en-US" sz="1700" dirty="0" smtClean="0"/>
+              <a:t>  </a:t>
+            </a:r>
+            <a:r>
+              <a:rPr lang="en-US" sz="1700" dirty="0" err="1" smtClean="0"/>
+              <a:t>DoD</a:t>
+            </a:r>
+            <a:endParaRPr lang="en-US" sz="1700" dirty="0" smtClean="0"/>
+          </a:p>
+          <a:p>
+            <a:pPr lvl="2"/>
+            <a:r>
+              <a:rPr lang="en-US" sz="1700" dirty="0" smtClean="0"/>
+              <a:t>Sequence length variation</a:t>
             </a:r>
           </a:p>
           <a:p>
             <a:pPr lvl="1"/>
             <a:r>
-              <a:rPr lang="en-US" dirty="0" smtClean="0"/>
-              <a:t>What are the CI challenges of NGS Analytics?</a:t>
+              <a:rPr lang="en-US" sz="1700" dirty="0" smtClean="0"/>
+              <a:t>DA challenges need to be addressed dynamically!</a:t>
             </a:r>
           </a:p>
           <a:p>
             <a:pPr lvl="2"/>
             <a:r>
-              <a:rPr lang="en-US" dirty="0" smtClean="0"/>
-              <a:t>Exploring HTC, HPC-grids and Clouds</a:t>
-            </a:r>
-          </a:p>
-          <a:p>
-            <a:r>
-              <a:rPr lang="en-US" dirty="0" smtClean="0"/>
-              <a:t>DARE-based Gateway</a:t>
+              <a:rPr lang="en-US" sz="1700" dirty="0" smtClean="0"/>
+              <a:t>Resource Elasticity/Cloudburst + Heterogeneous task-resource binding and need for application configuration trade-offs</a:t>
             </a:r>
           </a:p>
           <a:p>
             <a:pPr lvl="1"/>
             <a:r>
-              <a:rPr lang="en-US" dirty="0" smtClean="0"/>
-              <a:t>Extensions to abstractions for dynamic execution and data</a:t>
-            </a:r>
-          </a:p>
-          <a:p>
-            <a:pPr lvl="1"/>
-            <a:r>
-              <a:rPr lang="en-US" dirty="0" smtClean="0"/>
-              <a:t>Need for community provided solution on XD and other production DCI</a:t>
-            </a:r>
-          </a:p>
-          <a:p>
-            <a:pPr lvl="1"/>
-            <a:r>
-              <a:rPr lang="en-US" dirty="0" smtClean="0"/>
-              <a:t>Challenges remain in the scalable provisioning</a:t>
-            </a:r>
-          </a:p>
-          <a:p>
-            <a:pPr lvl="1"/>
-            <a:endParaRPr lang="en-US" dirty="0"/>
+              <a:rPr lang="en-US" sz="1700" dirty="0" smtClean="0"/>
+              <a:t>Is the Cloud data localization model scalable and/or sustainable?</a:t>
+            </a:r>
+          </a:p>
+          <a:p>
+            <a:pPr lvl="2"/>
+            <a:r>
+              <a:rPr lang="en-US" sz="1700" dirty="0" smtClean="0"/>
+              <a:t>Must address: How and when to move compute to data (or vice-versa) in scalable fashion?</a:t>
+            </a:r>
+          </a:p>
+          <a:p>
+            <a:pPr>
+              <a:buNone/>
+            </a:pPr>
+            <a:endParaRPr lang="en-US" sz="1700" dirty="0" smtClean="0"/>
           </a:p>
         </p:txBody>
       </p:sp>
@@ -8842,6 +8937,137 @@
           <a:lstStyle/>
           <a:p>
             <a:r>
+              <a:rPr lang="en-US" dirty="0" smtClean="0"/>
+              <a:t>Conclusions</a:t>
+            </a:r>
+            <a:endParaRPr lang="en-US" dirty="0"/>
+          </a:p>
+        </p:txBody>
+      </p:sp>
+      <p:sp>
+        <p:nvSpPr>
+          <p:cNvPr id="3" name="Content Placeholder 2"/>
+          <p:cNvSpPr>
+            <a:spLocks noGrp="1"/>
+          </p:cNvSpPr>
+          <p:nvPr>
+            <p:ph idx="1"/>
+          </p:nvPr>
+        </p:nvSpPr>
+        <p:spPr/>
+        <p:txBody>
+          <a:bodyPr>
+            <a:normAutofit/>
+          </a:bodyPr>
+          <a:lstStyle/>
+          <a:p>
+            <a:r>
+              <a:rPr lang="en-US" dirty="0" smtClean="0"/>
+              <a:t>LS Applications – compute and data intensive present broad range of challenges at scale</a:t>
+            </a:r>
+          </a:p>
+          <a:p>
+            <a:pPr lvl="1"/>
+            <a:r>
+              <a:rPr lang="en-US" dirty="0" smtClean="0"/>
+              <a:t>Have characterized BFAST as an example of alignment that can be used in  production DCI  </a:t>
+            </a:r>
+          </a:p>
+          <a:p>
+            <a:pPr lvl="1"/>
+            <a:r>
+              <a:rPr lang="en-US" dirty="0" smtClean="0"/>
+              <a:t>What are the CI challenges of NGS Analytics?</a:t>
+            </a:r>
+          </a:p>
+          <a:p>
+            <a:pPr lvl="2"/>
+            <a:r>
+              <a:rPr lang="en-US" dirty="0" smtClean="0"/>
+              <a:t>Exploring HTC, HPC-grids and Clouds</a:t>
+            </a:r>
+          </a:p>
+          <a:p>
+            <a:r>
+              <a:rPr lang="en-US" dirty="0" smtClean="0"/>
+              <a:t>DARE-based Gateway</a:t>
+            </a:r>
+          </a:p>
+          <a:p>
+            <a:pPr lvl="1"/>
+            <a:r>
+              <a:rPr lang="en-US" dirty="0" smtClean="0"/>
+              <a:t>Extensions to abstractions for dynamic execution and data</a:t>
+            </a:r>
+          </a:p>
+          <a:p>
+            <a:pPr lvl="1"/>
+            <a:r>
+              <a:rPr lang="en-US" dirty="0" smtClean="0"/>
+              <a:t>Need for community provided solution on XD and other production DCI</a:t>
+            </a:r>
+          </a:p>
+          <a:p>
+            <a:pPr lvl="1"/>
+            <a:r>
+              <a:rPr lang="en-US" dirty="0" smtClean="0"/>
+              <a:t>Challenges remain in the scalable provisioning</a:t>
+            </a:r>
+          </a:p>
+          <a:p>
+            <a:pPr lvl="1"/>
+            <a:endParaRPr lang="en-US" dirty="0"/>
+          </a:p>
+        </p:txBody>
+      </p:sp>
+    </p:spTree>
+  </p:cSld>
+  <p:clrMapOvr>
+    <a:masterClrMapping/>
+  </p:clrMapOvr>
+  <p:timing>
+    <p:tnLst>
+      <p:par>
+        <p:cTn id="1" dur="indefinite" restart="never" nodeType="tmRoot"/>
+      </p:par>
+    </p:tnLst>
+  </p:timing>
+</p:sld>
+</file>
+
+<file path=ppt/slides/slide22.xml><?xml version="1.0" encoding="utf-8"?>
+<p:sld xmlns:a="http://schemas.openxmlformats.org/drawingml/2006/main" xmlns:r="http://schemas.openxmlformats.org/officeDocument/2006/relationships" xmlns:mc="http://schemas.openxmlformats.org/markup-compatibility/2006" xmlns:mv="urn:schemas-microsoft-com:mac:vml" xmlns:p="http://schemas.openxmlformats.org/presentationml/2006/main" mc:Ignorable="mv" mc:PreserveAttributes="mv:*">
+  <p:cSld>
+    <p:spTree>
+      <p:nvGrpSpPr>
+        <p:cNvPr id="1" name=""/>
+        <p:cNvGrpSpPr/>
+        <p:nvPr/>
+      </p:nvGrpSpPr>
+      <p:grpSpPr>
+        <a:xfrm>
+          <a:off x="0" y="0"/>
+          <a:ext cx="0" cy="0"/>
+          <a:chOff x="0" y="0"/>
+          <a:chExt cx="0" cy="0"/>
+        </a:xfrm>
+      </p:grpSpPr>
+      <p:sp>
+        <p:nvSpPr>
+          <p:cNvPr id="2" name="Title 1"/>
+          <p:cNvSpPr>
+            <a:spLocks noGrp="1"/>
+          </p:cNvSpPr>
+          <p:nvPr>
+            <p:ph type="title"/>
+          </p:nvPr>
+        </p:nvSpPr>
+        <p:spPr/>
+        <p:txBody>
+          <a:bodyPr/>
+          <a:lstStyle/>
+          <a:p>
+            <a:r>
               <a:rPr lang="en-US" smtClean="0"/>
               <a:t>Acknowledgements</a:t>
             </a:r>
@@ -9057,7 +9283,7 @@
           <a:p>
             <a:r>
               <a:rPr lang="en-US" sz="2400" dirty="0" smtClean="0"/>
-              <a:t>NGS Analytics</a:t>
+              <a:t>The case for advanced NGS Analytics</a:t>
             </a:r>
             <a:endParaRPr lang="en-US" sz="2400" dirty="0"/>
           </a:p>
@@ -9271,7 +9497,7 @@
           <a:blip r:embed="rId3">
             <a:extLst>
               <a:ext uri="{28A0092B-C50C-407E-A947-70E740481C1C}">
-                <a14:useLocalDpi xmlns="" xmlns:a="http://schemas.openxmlformats.org/drawingml/2006/main" xmlns:r="http://schemas.openxmlformats.org/officeDocument/2006/relationships" xmlns:p="http://schemas.openxmlformats.org/presentationml/2006/main" xmlns:a14="http://schemas.microsoft.com/office/drawing/2010/main" xmlns:mv="urn:schemas-microsoft-com:mac:vml" xmlns:mc="http://schemas.openxmlformats.org/markup-compatibility/2006"/>
+                <a14:useLocalDpi xmlns:mc="http://schemas.openxmlformats.org/markup-compatibility/2006" xmlns:mv="urn:schemas-microsoft-com:mac:vml" xmlns:a14="http://schemas.microsoft.com/office/drawing/2010/main" xmlns:p="http://schemas.openxmlformats.org/presentationml/2006/main" xmlns:r="http://schemas.openxmlformats.org/officeDocument/2006/relationships" xmlns:a="http://schemas.openxmlformats.org/drawingml/2006/main" xmlns=""/>
               </a:ext>
             </a:extLst>
           </a:blip>
@@ -10140,7 +10366,7 @@
           <a:blip r:embed="rId2">
             <a:extLst>
               <a:ext uri="{28A0092B-C50C-407E-A947-70E740481C1C}">
-                <a14:useLocalDpi xmlns="" xmlns:a="http://schemas.openxmlformats.org/drawingml/2006/main" xmlns:r="http://schemas.openxmlformats.org/officeDocument/2006/relationships" xmlns:p="http://schemas.openxmlformats.org/presentationml/2006/main" xmlns:a14="http://schemas.microsoft.com/office/drawing/2010/main" xmlns:mv="urn:schemas-microsoft-com:mac:vml" xmlns:mc="http://schemas.openxmlformats.org/markup-compatibility/2006"/>
+                <a14:useLocalDpi xmlns:mc="http://schemas.openxmlformats.org/markup-compatibility/2006" xmlns:mv="urn:schemas-microsoft-com:mac:vml" xmlns:a14="http://schemas.microsoft.com/office/drawing/2010/main" xmlns:p="http://schemas.openxmlformats.org/presentationml/2006/main" xmlns:r="http://schemas.openxmlformats.org/officeDocument/2006/relationships" xmlns:a="http://schemas.openxmlformats.org/drawingml/2006/main" xmlns=""/>
               </a:ext>
             </a:extLst>
           </a:blip>
@@ -10252,7 +10478,7 @@
     </p:spTree>
     <p:extLst>
       <p:ext uri="{BB962C8B-B14F-4D97-AF65-F5344CB8AC3E}">
-        <p14:creationId xmlns="" xmlns:a="http://schemas.openxmlformats.org/drawingml/2006/main" xmlns:r="http://schemas.openxmlformats.org/officeDocument/2006/relationships" xmlns:p="http://schemas.openxmlformats.org/presentationml/2006/main" xmlns:p14="http://schemas.microsoft.com/office/powerpoint/2010/main" xmlns:mv="urn:schemas-microsoft-com:mac:vml" xmlns:mc="http://schemas.openxmlformats.org/markup-compatibility/2006" val="4280363161"/>
+        <p14:creationId xmlns:mc="http://schemas.openxmlformats.org/markup-compatibility/2006" xmlns:mv="urn:schemas-microsoft-com:mac:vml" xmlns:p14="http://schemas.microsoft.com/office/powerpoint/2010/main" xmlns:p="http://schemas.openxmlformats.org/presentationml/2006/main" xmlns:r="http://schemas.openxmlformats.org/officeDocument/2006/relationships" xmlns:a="http://schemas.openxmlformats.org/drawingml/2006/main" xmlns="" val="4280363161"/>
       </p:ext>
     </p:extLst>
   </p:cSld>
@@ -10836,14 +11062,16 @@
         </p:nvSpPr>
         <p:spPr/>
         <p:txBody>
-          <a:bodyPr/>
+          <a:bodyPr>
+            <a:normAutofit/>
+          </a:bodyPr>
           <a:lstStyle/>
           <a:p>
             <a:r>
-              <a:rPr lang="en-US" smtClean="0"/>
+              <a:rPr lang="en-US" sz="2800" dirty="0" smtClean="0"/>
               <a:t>SAGA – An Overview</a:t>
             </a:r>
-            <a:endParaRPr lang="en-US" dirty="0"/>
+            <a:endParaRPr lang="en-US" sz="2800" dirty="0"/>
           </a:p>
         </p:txBody>
       </p:sp>

</xml_diff>